<commit_message>
LobbyChaperone <-> EnterLobby Protocoll Communication elaborated
</commit_message>
<xml_diff>
--- a/Dependency.pptx
+++ b/Dependency.pptx
@@ -6,6 +6,7 @@
   </p:sldMasterIdLst>
   <p:sldIdLst>
     <p:sldId id="256" r:id="rId2"/>
+    <p:sldId id="257" r:id="rId3"/>
   </p:sldIdLst>
   <p:sldSz cx="12192000" cy="6858000"/>
   <p:notesSz cx="6858000" cy="9144000"/>
@@ -104,6 +105,11 @@
       </a:defRPr>
     </a:lvl9pPr>
   </p:defaultTextStyle>
+  <p:extLst>
+    <p:ext uri="{EFAFB233-063F-42B5-8137-9DF3F51BA10A}">
+      <p15:sldGuideLst xmlns:p15="http://schemas.microsoft.com/office/powerpoint/2012/main"/>
+    </p:ext>
+  </p:extLst>
 </p:presentation>
 </file>
 
@@ -254,7 +260,7 @@
           <a:p>
             <a:fld id="{F9BCB5B1-4190-47A4-9D68-6ED894D21B78}" type="datetimeFigureOut">
               <a:rPr lang="de-DE" smtClean="0"/>
-              <a:t>18.04.2020</a:t>
+              <a:t>25.04.2020</a:t>
             </a:fld>
             <a:endParaRPr lang="de-DE"/>
           </a:p>
@@ -452,7 +458,7 @@
           <a:p>
             <a:fld id="{F9BCB5B1-4190-47A4-9D68-6ED894D21B78}" type="datetimeFigureOut">
               <a:rPr lang="de-DE" smtClean="0"/>
-              <a:t>18.04.2020</a:t>
+              <a:t>25.04.2020</a:t>
             </a:fld>
             <a:endParaRPr lang="de-DE"/>
           </a:p>
@@ -660,7 +666,7 @@
           <a:p>
             <a:fld id="{F9BCB5B1-4190-47A4-9D68-6ED894D21B78}" type="datetimeFigureOut">
               <a:rPr lang="de-DE" smtClean="0"/>
-              <a:t>18.04.2020</a:t>
+              <a:t>25.04.2020</a:t>
             </a:fld>
             <a:endParaRPr lang="de-DE"/>
           </a:p>
@@ -858,7 +864,7 @@
           <a:p>
             <a:fld id="{F9BCB5B1-4190-47A4-9D68-6ED894D21B78}" type="datetimeFigureOut">
               <a:rPr lang="de-DE" smtClean="0"/>
-              <a:t>18.04.2020</a:t>
+              <a:t>25.04.2020</a:t>
             </a:fld>
             <a:endParaRPr lang="de-DE"/>
           </a:p>
@@ -1133,7 +1139,7 @@
           <a:p>
             <a:fld id="{F9BCB5B1-4190-47A4-9D68-6ED894D21B78}" type="datetimeFigureOut">
               <a:rPr lang="de-DE" smtClean="0"/>
-              <a:t>18.04.2020</a:t>
+              <a:t>25.04.2020</a:t>
             </a:fld>
             <a:endParaRPr lang="de-DE"/>
           </a:p>
@@ -1398,7 +1404,7 @@
           <a:p>
             <a:fld id="{F9BCB5B1-4190-47A4-9D68-6ED894D21B78}" type="datetimeFigureOut">
               <a:rPr lang="de-DE" smtClean="0"/>
-              <a:t>18.04.2020</a:t>
+              <a:t>25.04.2020</a:t>
             </a:fld>
             <a:endParaRPr lang="de-DE"/>
           </a:p>
@@ -1810,7 +1816,7 @@
           <a:p>
             <a:fld id="{F9BCB5B1-4190-47A4-9D68-6ED894D21B78}" type="datetimeFigureOut">
               <a:rPr lang="de-DE" smtClean="0"/>
-              <a:t>18.04.2020</a:t>
+              <a:t>25.04.2020</a:t>
             </a:fld>
             <a:endParaRPr lang="de-DE"/>
           </a:p>
@@ -1951,7 +1957,7 @@
           <a:p>
             <a:fld id="{F9BCB5B1-4190-47A4-9D68-6ED894D21B78}" type="datetimeFigureOut">
               <a:rPr lang="de-DE" smtClean="0"/>
-              <a:t>18.04.2020</a:t>
+              <a:t>25.04.2020</a:t>
             </a:fld>
             <a:endParaRPr lang="de-DE"/>
           </a:p>
@@ -2064,7 +2070,7 @@
           <a:p>
             <a:fld id="{F9BCB5B1-4190-47A4-9D68-6ED894D21B78}" type="datetimeFigureOut">
               <a:rPr lang="de-DE" smtClean="0"/>
-              <a:t>18.04.2020</a:t>
+              <a:t>25.04.2020</a:t>
             </a:fld>
             <a:endParaRPr lang="de-DE"/>
           </a:p>
@@ -2375,7 +2381,7 @@
           <a:p>
             <a:fld id="{F9BCB5B1-4190-47A4-9D68-6ED894D21B78}" type="datetimeFigureOut">
               <a:rPr lang="de-DE" smtClean="0"/>
-              <a:t>18.04.2020</a:t>
+              <a:t>25.04.2020</a:t>
             </a:fld>
             <a:endParaRPr lang="de-DE"/>
           </a:p>
@@ -2663,7 +2669,7 @@
           <a:p>
             <a:fld id="{F9BCB5B1-4190-47A4-9D68-6ED894D21B78}" type="datetimeFigureOut">
               <a:rPr lang="de-DE" smtClean="0"/>
-              <a:t>18.04.2020</a:t>
+              <a:t>25.04.2020</a:t>
             </a:fld>
             <a:endParaRPr lang="de-DE"/>
           </a:p>
@@ -2904,7 +2910,7 @@
           <a:p>
             <a:fld id="{F9BCB5B1-4190-47A4-9D68-6ED894D21B78}" type="datetimeFigureOut">
               <a:rPr lang="de-DE" smtClean="0"/>
-              <a:t>18.04.2020</a:t>
+              <a:t>25.04.2020</a:t>
             </a:fld>
             <a:endParaRPr lang="de-DE"/>
           </a:p>
@@ -3591,10 +3597,10 @@
         </p:nvGrpSpPr>
         <p:grpSpPr>
           <a:xfrm>
-            <a:off x="4218385" y="1188113"/>
-            <a:ext cx="1759451" cy="3163182"/>
-            <a:chOff x="2603500" y="1228219"/>
-            <a:chExt cx="1371600" cy="3163182"/>
+            <a:off x="4218385" y="803837"/>
+            <a:ext cx="1759451" cy="3547458"/>
+            <a:chOff x="2603500" y="843943"/>
+            <a:chExt cx="1371600" cy="3547458"/>
           </a:xfrm>
         </p:grpSpPr>
         <p:grpSp>
@@ -3611,10 +3617,10 @@
           </p:nvGrpSpPr>
           <p:grpSpPr>
             <a:xfrm>
-              <a:off x="2603500" y="1228219"/>
-              <a:ext cx="1371600" cy="1541485"/>
-              <a:chOff x="2603500" y="1228219"/>
-              <a:chExt cx="1371600" cy="1541485"/>
+              <a:off x="2603500" y="843943"/>
+              <a:ext cx="1371600" cy="1925761"/>
+              <a:chOff x="2603500" y="843943"/>
+              <a:chExt cx="1371600" cy="1925761"/>
             </a:xfrm>
           </p:grpSpPr>
           <p:sp>
@@ -3681,8 +3687,8 @@
             </p:nvSpPr>
             <p:spPr>
               <a:xfrm>
-                <a:off x="3055181" y="1228219"/>
-                <a:ext cx="468238" cy="364067"/>
+                <a:off x="2882465" y="843943"/>
+                <a:ext cx="815136" cy="364067"/>
               </a:xfrm>
               <a:prstGeom prst="rect">
                 <a:avLst/>
@@ -3711,7 +3717,7 @@
                 <a:pPr algn="ctr"/>
                 <a:r>
                   <a:rPr lang="de-DE" sz="1200" dirty="0" err="1"/>
-                  <a:t>libnop</a:t>
+                  <a:t>concQueue</a:t>
                 </a:r>
                 <a:endParaRPr lang="de-DE" sz="1200" dirty="0"/>
               </a:p>
@@ -3833,9 +3839,9 @@
               <p:nvPr/>
             </p:nvCxnSpPr>
             <p:spPr>
-              <a:xfrm>
-                <a:off x="3289300" y="1592286"/>
-                <a:ext cx="0" cy="474685"/>
+              <a:xfrm flipH="1">
+                <a:off x="3289300" y="1208010"/>
+                <a:ext cx="733" cy="858961"/>
               </a:xfrm>
               <a:prstGeom prst="straightConnector1">
                 <a:avLst/>
@@ -4584,6 +4590,1292 @@
     <p:extLst>
       <p:ext uri="{BB962C8B-B14F-4D97-AF65-F5344CB8AC3E}">
         <p14:creationId xmlns:p14="http://schemas.microsoft.com/office/powerpoint/2010/main" val="4094669181"/>
+      </p:ext>
+    </p:extLst>
+  </p:cSld>
+  <p:clrMapOvr>
+    <a:masterClrMapping/>
+  </p:clrMapOvr>
+</p:sld>
+</file>
+
+<file path=ppt/slides/slide2.xml><?xml version="1.0" encoding="utf-8"?>
+<p:sld xmlns:a="http://schemas.openxmlformats.org/drawingml/2006/main" xmlns:r="http://schemas.openxmlformats.org/officeDocument/2006/relationships" xmlns:p="http://schemas.openxmlformats.org/presentationml/2006/main">
+  <p:cSld>
+    <p:spTree>
+      <p:nvGrpSpPr>
+        <p:cNvPr id="1" name=""/>
+        <p:cNvGrpSpPr/>
+        <p:nvPr/>
+      </p:nvGrpSpPr>
+      <p:grpSpPr>
+        <a:xfrm>
+          <a:off x="0" y="0"/>
+          <a:ext cx="0" cy="0"/>
+          <a:chOff x="0" y="0"/>
+          <a:chExt cx="0" cy="0"/>
+        </a:xfrm>
+      </p:grpSpPr>
+      <p:sp>
+        <p:nvSpPr>
+          <p:cNvPr id="2" name="Textfeld 1">
+            <a:extLst>
+              <a:ext uri="{FF2B5EF4-FFF2-40B4-BE49-F238E27FC236}">
+                <a16:creationId xmlns:a16="http://schemas.microsoft.com/office/drawing/2014/main" id="{66441CF1-63C1-40E6-A7C4-BD873D29FD3F}"/>
+              </a:ext>
+            </a:extLst>
+          </p:cNvPr>
+          <p:cNvSpPr txBox="1"/>
+          <p:nvPr/>
+        </p:nvSpPr>
+        <p:spPr>
+          <a:xfrm>
+            <a:off x="0" y="0"/>
+            <a:ext cx="2535767" cy="369332"/>
+          </a:xfrm>
+          <a:prstGeom prst="rect">
+            <a:avLst/>
+          </a:prstGeom>
+          <a:noFill/>
+        </p:spPr>
+        <p:txBody>
+          <a:bodyPr wrap="square" rtlCol="0">
+            <a:spAutoFit/>
+          </a:bodyPr>
+          <a:lstStyle/>
+          <a:p>
+            <a:r>
+              <a:rPr lang="de-DE" dirty="0"/>
+              <a:t>Network </a:t>
+            </a:r>
+            <a:r>
+              <a:rPr lang="de-DE" dirty="0" err="1"/>
+              <a:t>Protocoll</a:t>
+            </a:r>
+            <a:endParaRPr lang="de-DE" dirty="0"/>
+          </a:p>
+        </p:txBody>
+      </p:sp>
+      <p:sp>
+        <p:nvSpPr>
+          <p:cNvPr id="3" name="Rechteck 2">
+            <a:extLst>
+              <a:ext uri="{FF2B5EF4-FFF2-40B4-BE49-F238E27FC236}">
+                <a16:creationId xmlns:a16="http://schemas.microsoft.com/office/drawing/2014/main" id="{53F9BF52-FFCC-43FD-9C8D-0935F9B97ACE}"/>
+              </a:ext>
+            </a:extLst>
+          </p:cNvPr>
+          <p:cNvSpPr/>
+          <p:nvPr/>
+        </p:nvSpPr>
+        <p:spPr>
+          <a:xfrm>
+            <a:off x="690033" y="804333"/>
+            <a:ext cx="1092200" cy="855133"/>
+          </a:xfrm>
+          <a:prstGeom prst="rect">
+            <a:avLst/>
+          </a:prstGeom>
+        </p:spPr>
+        <p:style>
+          <a:lnRef idx="2">
+            <a:schemeClr val="accent1">
+              <a:shade val="50000"/>
+            </a:schemeClr>
+          </a:lnRef>
+          <a:fillRef idx="1">
+            <a:schemeClr val="accent1"/>
+          </a:fillRef>
+          <a:effectRef idx="0">
+            <a:schemeClr val="accent1"/>
+          </a:effectRef>
+          <a:fontRef idx="minor">
+            <a:schemeClr val="lt1"/>
+          </a:fontRef>
+        </p:style>
+        <p:txBody>
+          <a:bodyPr rtlCol="0" anchor="ctr"/>
+          <a:lstStyle/>
+          <a:p>
+            <a:pPr algn="ctr"/>
+            <a:r>
+              <a:rPr lang="de-DE" dirty="0"/>
+              <a:t>Lobby</a:t>
+            </a:r>
+          </a:p>
+        </p:txBody>
+      </p:sp>
+      <p:sp>
+        <p:nvSpPr>
+          <p:cNvPr id="4" name="Rechteck 3">
+            <a:extLst>
+              <a:ext uri="{FF2B5EF4-FFF2-40B4-BE49-F238E27FC236}">
+                <a16:creationId xmlns:a16="http://schemas.microsoft.com/office/drawing/2014/main" id="{FFC3BF6E-7610-4579-B9C8-69CE79826001}"/>
+              </a:ext>
+            </a:extLst>
+          </p:cNvPr>
+          <p:cNvSpPr/>
+          <p:nvPr/>
+        </p:nvSpPr>
+        <p:spPr>
+          <a:xfrm>
+            <a:off x="2840567" y="804330"/>
+            <a:ext cx="1820333" cy="855133"/>
+          </a:xfrm>
+          <a:prstGeom prst="rect">
+            <a:avLst/>
+          </a:prstGeom>
+        </p:spPr>
+        <p:style>
+          <a:lnRef idx="2">
+            <a:schemeClr val="accent6">
+              <a:shade val="50000"/>
+            </a:schemeClr>
+          </a:lnRef>
+          <a:fillRef idx="1">
+            <a:schemeClr val="accent6"/>
+          </a:fillRef>
+          <a:effectRef idx="0">
+            <a:schemeClr val="accent6"/>
+          </a:effectRef>
+          <a:fontRef idx="minor">
+            <a:schemeClr val="lt1"/>
+          </a:fontRef>
+        </p:style>
+        <p:txBody>
+          <a:bodyPr rtlCol="0" anchor="ctr"/>
+          <a:lstStyle/>
+          <a:p>
+            <a:pPr algn="ctr"/>
+            <a:r>
+              <a:rPr lang="de-DE" dirty="0" err="1"/>
+              <a:t>LobbyConnector</a:t>
+            </a:r>
+            <a:endParaRPr lang="de-DE" dirty="0"/>
+          </a:p>
+        </p:txBody>
+      </p:sp>
+      <p:cxnSp>
+        <p:nvCxnSpPr>
+          <p:cNvPr id="6" name="Gerade Verbindung mit Pfeil 5">
+            <a:extLst>
+              <a:ext uri="{FF2B5EF4-FFF2-40B4-BE49-F238E27FC236}">
+                <a16:creationId xmlns:a16="http://schemas.microsoft.com/office/drawing/2014/main" id="{E28208AF-7141-4EB5-A10F-7481B7F686F4}"/>
+              </a:ext>
+            </a:extLst>
+          </p:cNvPr>
+          <p:cNvCxnSpPr>
+            <a:cxnSpLocks/>
+          </p:cNvCxnSpPr>
+          <p:nvPr/>
+        </p:nvCxnSpPr>
+        <p:spPr>
+          <a:xfrm flipH="1" flipV="1">
+            <a:off x="1739900" y="1049867"/>
+            <a:ext cx="1092200" cy="1"/>
+          </a:xfrm>
+          <a:prstGeom prst="straightConnector1">
+            <a:avLst/>
+          </a:prstGeom>
+          <a:ln w="57150">
+            <a:tailEnd type="triangle"/>
+          </a:ln>
+        </p:spPr>
+        <p:style>
+          <a:lnRef idx="1">
+            <a:schemeClr val="accent1"/>
+          </a:lnRef>
+          <a:fillRef idx="0">
+            <a:schemeClr val="accent1"/>
+          </a:fillRef>
+          <a:effectRef idx="0">
+            <a:schemeClr val="accent1"/>
+          </a:effectRef>
+          <a:fontRef idx="minor">
+            <a:schemeClr val="tx1"/>
+          </a:fontRef>
+        </p:style>
+      </p:cxnSp>
+      <p:sp>
+        <p:nvSpPr>
+          <p:cNvPr id="7" name="Textfeld 6">
+            <a:extLst>
+              <a:ext uri="{FF2B5EF4-FFF2-40B4-BE49-F238E27FC236}">
+                <a16:creationId xmlns:a16="http://schemas.microsoft.com/office/drawing/2014/main" id="{9376C8D1-9682-44A3-AA7F-F791D64BFAE7}"/>
+              </a:ext>
+            </a:extLst>
+          </p:cNvPr>
+          <p:cNvSpPr txBox="1"/>
+          <p:nvPr/>
+        </p:nvSpPr>
+        <p:spPr>
+          <a:xfrm>
+            <a:off x="1909233" y="762000"/>
+            <a:ext cx="1003300" cy="369332"/>
+          </a:xfrm>
+          <a:prstGeom prst="rect">
+            <a:avLst/>
+          </a:prstGeom>
+          <a:noFill/>
+        </p:spPr>
+        <p:txBody>
+          <a:bodyPr wrap="square" rtlCol="0">
+            <a:spAutoFit/>
+          </a:bodyPr>
+          <a:lstStyle/>
+          <a:p>
+            <a:r>
+              <a:rPr lang="de-DE" dirty="0"/>
+              <a:t>connect</a:t>
+            </a:r>
+          </a:p>
+        </p:txBody>
+      </p:sp>
+      <p:cxnSp>
+        <p:nvCxnSpPr>
+          <p:cNvPr id="9" name="Gerade Verbindung mit Pfeil 8">
+            <a:extLst>
+              <a:ext uri="{FF2B5EF4-FFF2-40B4-BE49-F238E27FC236}">
+                <a16:creationId xmlns:a16="http://schemas.microsoft.com/office/drawing/2014/main" id="{F094CBE5-52F3-42DC-99A6-4C011D182656}"/>
+              </a:ext>
+            </a:extLst>
+          </p:cNvPr>
+          <p:cNvCxnSpPr/>
+          <p:nvPr/>
+        </p:nvCxnSpPr>
+        <p:spPr>
+          <a:xfrm>
+            <a:off x="1828800" y="1638296"/>
+            <a:ext cx="1011767" cy="0"/>
+          </a:xfrm>
+          <a:prstGeom prst="straightConnector1">
+            <a:avLst/>
+          </a:prstGeom>
+          <a:ln w="57150">
+            <a:tailEnd type="triangle"/>
+          </a:ln>
+        </p:spPr>
+        <p:style>
+          <a:lnRef idx="1">
+            <a:schemeClr val="accent1"/>
+          </a:lnRef>
+          <a:fillRef idx="0">
+            <a:schemeClr val="accent1"/>
+          </a:fillRef>
+          <a:effectRef idx="0">
+            <a:schemeClr val="accent1"/>
+          </a:effectRef>
+          <a:fontRef idx="minor">
+            <a:schemeClr val="tx1"/>
+          </a:fontRef>
+        </p:style>
+      </p:cxnSp>
+      <p:sp>
+        <p:nvSpPr>
+          <p:cNvPr id="10" name="Textfeld 9">
+            <a:extLst>
+              <a:ext uri="{FF2B5EF4-FFF2-40B4-BE49-F238E27FC236}">
+                <a16:creationId xmlns:a16="http://schemas.microsoft.com/office/drawing/2014/main" id="{51724256-26CD-4F40-A772-EC1FA3ED7D67}"/>
+              </a:ext>
+            </a:extLst>
+          </p:cNvPr>
+          <p:cNvSpPr txBox="1"/>
+          <p:nvPr/>
+        </p:nvSpPr>
+        <p:spPr>
+          <a:xfrm>
+            <a:off x="1828800" y="1361071"/>
+            <a:ext cx="1003300" cy="215444"/>
+          </a:xfrm>
+          <a:prstGeom prst="rect">
+            <a:avLst/>
+          </a:prstGeom>
+          <a:noFill/>
+        </p:spPr>
+        <p:txBody>
+          <a:bodyPr wrap="square" rtlCol="0">
+            <a:spAutoFit/>
+          </a:bodyPr>
+          <a:lstStyle/>
+          <a:p>
+            <a:r>
+              <a:rPr lang="de-DE" sz="800" dirty="0" err="1"/>
+              <a:t>LobbyInstructions</a:t>
+            </a:r>
+            <a:endParaRPr lang="de-DE" sz="800" dirty="0"/>
+          </a:p>
+        </p:txBody>
+      </p:sp>
+      <p:sp>
+        <p:nvSpPr>
+          <p:cNvPr id="13" name="Textfeld 12">
+            <a:extLst>
+              <a:ext uri="{FF2B5EF4-FFF2-40B4-BE49-F238E27FC236}">
+                <a16:creationId xmlns:a16="http://schemas.microsoft.com/office/drawing/2014/main" id="{E13F1D8C-BFFF-4E51-91D9-197BC488E448}"/>
+              </a:ext>
+            </a:extLst>
+          </p:cNvPr>
+          <p:cNvSpPr txBox="1"/>
+          <p:nvPr/>
+        </p:nvSpPr>
+        <p:spPr>
+          <a:xfrm>
+            <a:off x="2781300" y="843747"/>
+            <a:ext cx="177800" cy="369332"/>
+          </a:xfrm>
+          <a:prstGeom prst="rect">
+            <a:avLst/>
+          </a:prstGeom>
+          <a:noFill/>
+        </p:spPr>
+        <p:txBody>
+          <a:bodyPr wrap="square" rtlCol="0">
+            <a:spAutoFit/>
+          </a:bodyPr>
+          <a:lstStyle/>
+          <a:p>
+            <a:r>
+              <a:rPr lang="de-DE" dirty="0"/>
+              <a:t>1</a:t>
+            </a:r>
+          </a:p>
+        </p:txBody>
+      </p:sp>
+      <p:sp>
+        <p:nvSpPr>
+          <p:cNvPr id="14" name="Textfeld 13">
+            <a:extLst>
+              <a:ext uri="{FF2B5EF4-FFF2-40B4-BE49-F238E27FC236}">
+                <a16:creationId xmlns:a16="http://schemas.microsoft.com/office/drawing/2014/main" id="{7C229676-340A-4935-B0FB-631CF6719F6E}"/>
+              </a:ext>
+            </a:extLst>
+          </p:cNvPr>
+          <p:cNvSpPr txBox="1"/>
+          <p:nvPr/>
+        </p:nvSpPr>
+        <p:spPr>
+          <a:xfrm>
+            <a:off x="1579033" y="1361071"/>
+            <a:ext cx="177800" cy="369332"/>
+          </a:xfrm>
+          <a:prstGeom prst="rect">
+            <a:avLst/>
+          </a:prstGeom>
+          <a:noFill/>
+        </p:spPr>
+        <p:txBody>
+          <a:bodyPr wrap="square" rtlCol="0">
+            <a:spAutoFit/>
+          </a:bodyPr>
+          <a:lstStyle/>
+          <a:p>
+            <a:r>
+              <a:rPr lang="de-DE" dirty="0"/>
+              <a:t>2</a:t>
+            </a:r>
+          </a:p>
+        </p:txBody>
+      </p:sp>
+      <p:cxnSp>
+        <p:nvCxnSpPr>
+          <p:cNvPr id="15" name="Gerade Verbindung mit Pfeil 14">
+            <a:extLst>
+              <a:ext uri="{FF2B5EF4-FFF2-40B4-BE49-F238E27FC236}">
+                <a16:creationId xmlns:a16="http://schemas.microsoft.com/office/drawing/2014/main" id="{D064D476-0085-4EF7-942B-C2016DA92559}"/>
+              </a:ext>
+            </a:extLst>
+          </p:cNvPr>
+          <p:cNvCxnSpPr>
+            <a:cxnSpLocks/>
+          </p:cNvCxnSpPr>
+          <p:nvPr/>
+        </p:nvCxnSpPr>
+        <p:spPr>
+          <a:xfrm>
+            <a:off x="1174750" y="1659463"/>
+            <a:ext cx="0" cy="457203"/>
+          </a:xfrm>
+          <a:prstGeom prst="straightConnector1">
+            <a:avLst/>
+          </a:prstGeom>
+          <a:ln w="57150">
+            <a:tailEnd type="triangle"/>
+          </a:ln>
+        </p:spPr>
+        <p:style>
+          <a:lnRef idx="1">
+            <a:schemeClr val="accent1"/>
+          </a:lnRef>
+          <a:fillRef idx="0">
+            <a:schemeClr val="accent1"/>
+          </a:fillRef>
+          <a:effectRef idx="0">
+            <a:schemeClr val="accent1"/>
+          </a:effectRef>
+          <a:fontRef idx="minor">
+            <a:schemeClr val="tx1"/>
+          </a:fontRef>
+        </p:style>
+      </p:cxnSp>
+      <p:sp>
+        <p:nvSpPr>
+          <p:cNvPr id="17" name="Textfeld 16">
+            <a:extLst>
+              <a:ext uri="{FF2B5EF4-FFF2-40B4-BE49-F238E27FC236}">
+                <a16:creationId xmlns:a16="http://schemas.microsoft.com/office/drawing/2014/main" id="{33F29428-2335-4A7A-BDC8-0126E2649EDF}"/>
+              </a:ext>
+            </a:extLst>
+          </p:cNvPr>
+          <p:cNvSpPr txBox="1"/>
+          <p:nvPr/>
+        </p:nvSpPr>
+        <p:spPr>
+          <a:xfrm>
+            <a:off x="1166283" y="1748821"/>
+            <a:ext cx="853015" cy="215444"/>
+          </a:xfrm>
+          <a:prstGeom prst="rect">
+            <a:avLst/>
+          </a:prstGeom>
+          <a:noFill/>
+        </p:spPr>
+        <p:txBody>
+          <a:bodyPr wrap="square" rtlCol="0">
+            <a:spAutoFit/>
+          </a:bodyPr>
+          <a:lstStyle/>
+          <a:p>
+            <a:r>
+              <a:rPr lang="de-DE" sz="800" dirty="0" err="1"/>
+              <a:t>SpawnProtocoll</a:t>
+            </a:r>
+            <a:endParaRPr lang="de-DE" sz="800" dirty="0"/>
+          </a:p>
+        </p:txBody>
+      </p:sp>
+      <p:sp>
+        <p:nvSpPr>
+          <p:cNvPr id="18" name="Rechteck 17">
+            <a:extLst>
+              <a:ext uri="{FF2B5EF4-FFF2-40B4-BE49-F238E27FC236}">
+                <a16:creationId xmlns:a16="http://schemas.microsoft.com/office/drawing/2014/main" id="{163189B4-AAE7-4E82-A4BF-4BBAA02C43B5}"/>
+              </a:ext>
+            </a:extLst>
+          </p:cNvPr>
+          <p:cNvSpPr/>
+          <p:nvPr/>
+        </p:nvSpPr>
+        <p:spPr>
+          <a:xfrm>
+            <a:off x="721783" y="2138287"/>
+            <a:ext cx="1092200" cy="2484513"/>
+          </a:xfrm>
+          <a:prstGeom prst="rect">
+            <a:avLst/>
+          </a:prstGeom>
+        </p:spPr>
+        <p:style>
+          <a:lnRef idx="2">
+            <a:schemeClr val="accent1">
+              <a:shade val="50000"/>
+            </a:schemeClr>
+          </a:lnRef>
+          <a:fillRef idx="1">
+            <a:schemeClr val="accent1"/>
+          </a:fillRef>
+          <a:effectRef idx="0">
+            <a:schemeClr val="accent1"/>
+          </a:effectRef>
+          <a:fontRef idx="minor">
+            <a:schemeClr val="lt1"/>
+          </a:fontRef>
+        </p:style>
+        <p:txBody>
+          <a:bodyPr rtlCol="0" anchor="ctr"/>
+          <a:lstStyle/>
+          <a:p>
+            <a:pPr algn="ctr"/>
+            <a:r>
+              <a:rPr lang="de-DE" sz="800" dirty="0" err="1"/>
+              <a:t>ClientChaperone</a:t>
+            </a:r>
+            <a:endParaRPr lang="de-DE" sz="800" dirty="0"/>
+          </a:p>
+        </p:txBody>
+      </p:sp>
+      <p:sp>
+        <p:nvSpPr>
+          <p:cNvPr id="20" name="Textfeld 19">
+            <a:extLst>
+              <a:ext uri="{FF2B5EF4-FFF2-40B4-BE49-F238E27FC236}">
+                <a16:creationId xmlns:a16="http://schemas.microsoft.com/office/drawing/2014/main" id="{855B8689-3921-489C-B98F-6B5458124A08}"/>
+              </a:ext>
+            </a:extLst>
+          </p:cNvPr>
+          <p:cNvSpPr txBox="1"/>
+          <p:nvPr/>
+        </p:nvSpPr>
+        <p:spPr>
+          <a:xfrm>
+            <a:off x="994831" y="1377145"/>
+            <a:ext cx="287869" cy="369332"/>
+          </a:xfrm>
+          <a:prstGeom prst="rect">
+            <a:avLst/>
+          </a:prstGeom>
+          <a:noFill/>
+        </p:spPr>
+        <p:txBody>
+          <a:bodyPr wrap="square" rtlCol="0">
+            <a:spAutoFit/>
+          </a:bodyPr>
+          <a:lstStyle/>
+          <a:p>
+            <a:r>
+              <a:rPr lang="de-DE" dirty="0"/>
+              <a:t>2</a:t>
+            </a:r>
+          </a:p>
+        </p:txBody>
+      </p:sp>
+      <p:cxnSp>
+        <p:nvCxnSpPr>
+          <p:cNvPr id="22" name="Gerade Verbindung mit Pfeil 21">
+            <a:extLst>
+              <a:ext uri="{FF2B5EF4-FFF2-40B4-BE49-F238E27FC236}">
+                <a16:creationId xmlns:a16="http://schemas.microsoft.com/office/drawing/2014/main" id="{4BA710D2-00BB-4398-9E54-5188033E1BF7}"/>
+              </a:ext>
+            </a:extLst>
+          </p:cNvPr>
+          <p:cNvCxnSpPr>
+            <a:cxnSpLocks/>
+          </p:cNvCxnSpPr>
+          <p:nvPr/>
+        </p:nvCxnSpPr>
+        <p:spPr>
+          <a:xfrm flipV="1">
+            <a:off x="1828800" y="2337250"/>
+            <a:ext cx="582083" cy="261610"/>
+          </a:xfrm>
+          <a:prstGeom prst="straightConnector1">
+            <a:avLst/>
+          </a:prstGeom>
+          <a:ln w="57150">
+            <a:tailEnd type="triangle"/>
+          </a:ln>
+        </p:spPr>
+        <p:style>
+          <a:lnRef idx="1">
+            <a:schemeClr val="accent1"/>
+          </a:lnRef>
+          <a:fillRef idx="0">
+            <a:schemeClr val="accent1"/>
+          </a:fillRef>
+          <a:effectRef idx="0">
+            <a:schemeClr val="accent1"/>
+          </a:effectRef>
+          <a:fontRef idx="minor">
+            <a:schemeClr val="tx1"/>
+          </a:fontRef>
+        </p:style>
+      </p:cxnSp>
+      <p:cxnSp>
+        <p:nvCxnSpPr>
+          <p:cNvPr id="25" name="Gerade Verbindung mit Pfeil 24">
+            <a:extLst>
+              <a:ext uri="{FF2B5EF4-FFF2-40B4-BE49-F238E27FC236}">
+                <a16:creationId xmlns:a16="http://schemas.microsoft.com/office/drawing/2014/main" id="{C8B00582-1F2A-46AE-ACDB-6577203E7572}"/>
+              </a:ext>
+            </a:extLst>
+          </p:cNvPr>
+          <p:cNvCxnSpPr>
+            <a:cxnSpLocks/>
+            <a:stCxn id="4" idx="2"/>
+          </p:cNvCxnSpPr>
+          <p:nvPr/>
+        </p:nvCxnSpPr>
+        <p:spPr>
+          <a:xfrm flipH="1">
+            <a:off x="2410883" y="1659463"/>
+            <a:ext cx="1339851" cy="677787"/>
+          </a:xfrm>
+          <a:prstGeom prst="straightConnector1">
+            <a:avLst/>
+          </a:prstGeom>
+          <a:ln w="57150">
+            <a:tailEnd type="triangle"/>
+          </a:ln>
+        </p:spPr>
+        <p:style>
+          <a:lnRef idx="1">
+            <a:schemeClr val="accent1"/>
+          </a:lnRef>
+          <a:fillRef idx="0">
+            <a:schemeClr val="accent1"/>
+          </a:fillRef>
+          <a:effectRef idx="0">
+            <a:schemeClr val="accent1"/>
+          </a:effectRef>
+          <a:fontRef idx="minor">
+            <a:schemeClr val="tx1"/>
+          </a:fontRef>
+        </p:style>
+      </p:cxnSp>
+      <p:sp>
+        <p:nvSpPr>
+          <p:cNvPr id="28" name="Textfeld 27">
+            <a:extLst>
+              <a:ext uri="{FF2B5EF4-FFF2-40B4-BE49-F238E27FC236}">
+                <a16:creationId xmlns:a16="http://schemas.microsoft.com/office/drawing/2014/main" id="{7BBACBC6-63B4-41C4-8495-B25A0064A788}"/>
+              </a:ext>
+            </a:extLst>
+          </p:cNvPr>
+          <p:cNvSpPr txBox="1"/>
+          <p:nvPr/>
+        </p:nvSpPr>
+        <p:spPr>
+          <a:xfrm>
+            <a:off x="2004483" y="2181701"/>
+            <a:ext cx="1003300" cy="369332"/>
+          </a:xfrm>
+          <a:prstGeom prst="rect">
+            <a:avLst/>
+          </a:prstGeom>
+          <a:noFill/>
+        </p:spPr>
+        <p:txBody>
+          <a:bodyPr wrap="square" rtlCol="0">
+            <a:spAutoFit/>
+          </a:bodyPr>
+          <a:lstStyle/>
+          <a:p>
+            <a:r>
+              <a:rPr lang="de-DE" dirty="0"/>
+              <a:t>connect</a:t>
+            </a:r>
+          </a:p>
+        </p:txBody>
+      </p:sp>
+      <p:sp>
+        <p:nvSpPr>
+          <p:cNvPr id="29" name="Textfeld 28">
+            <a:extLst>
+              <a:ext uri="{FF2B5EF4-FFF2-40B4-BE49-F238E27FC236}">
+                <a16:creationId xmlns:a16="http://schemas.microsoft.com/office/drawing/2014/main" id="{C64D97D8-23FC-40E1-92CA-F09D079D4907}"/>
+              </a:ext>
+            </a:extLst>
+          </p:cNvPr>
+          <p:cNvSpPr txBox="1"/>
+          <p:nvPr/>
+        </p:nvSpPr>
+        <p:spPr>
+          <a:xfrm>
+            <a:off x="1932514" y="1992805"/>
+            <a:ext cx="287869" cy="369332"/>
+          </a:xfrm>
+          <a:prstGeom prst="rect">
+            <a:avLst/>
+          </a:prstGeom>
+          <a:noFill/>
+        </p:spPr>
+        <p:txBody>
+          <a:bodyPr wrap="square" rtlCol="0">
+            <a:spAutoFit/>
+          </a:bodyPr>
+          <a:lstStyle/>
+          <a:p>
+            <a:r>
+              <a:rPr lang="de-DE" dirty="0"/>
+              <a:t>3</a:t>
+            </a:r>
+          </a:p>
+        </p:txBody>
+      </p:sp>
+      <p:cxnSp>
+        <p:nvCxnSpPr>
+          <p:cNvPr id="30" name="Gerade Verbindung mit Pfeil 29">
+            <a:extLst>
+              <a:ext uri="{FF2B5EF4-FFF2-40B4-BE49-F238E27FC236}">
+                <a16:creationId xmlns:a16="http://schemas.microsoft.com/office/drawing/2014/main" id="{99B8090A-C362-42E7-A5B9-934F8196D4B1}"/>
+              </a:ext>
+            </a:extLst>
+          </p:cNvPr>
+          <p:cNvCxnSpPr>
+            <a:cxnSpLocks/>
+            <a:endCxn id="33" idx="0"/>
+          </p:cNvCxnSpPr>
+          <p:nvPr/>
+        </p:nvCxnSpPr>
+        <p:spPr>
+          <a:xfrm flipH="1">
+            <a:off x="3968750" y="1670046"/>
+            <a:ext cx="6352" cy="569258"/>
+          </a:xfrm>
+          <a:prstGeom prst="straightConnector1">
+            <a:avLst/>
+          </a:prstGeom>
+          <a:ln w="57150">
+            <a:tailEnd type="triangle"/>
+          </a:ln>
+        </p:spPr>
+        <p:style>
+          <a:lnRef idx="1">
+            <a:schemeClr val="accent1"/>
+          </a:lnRef>
+          <a:fillRef idx="0">
+            <a:schemeClr val="accent1"/>
+          </a:fillRef>
+          <a:effectRef idx="0">
+            <a:schemeClr val="accent1"/>
+          </a:effectRef>
+          <a:fontRef idx="minor">
+            <a:schemeClr val="tx1"/>
+          </a:fontRef>
+        </p:style>
+      </p:cxnSp>
+      <p:sp>
+        <p:nvSpPr>
+          <p:cNvPr id="33" name="Rechteck 32">
+            <a:extLst>
+              <a:ext uri="{FF2B5EF4-FFF2-40B4-BE49-F238E27FC236}">
+                <a16:creationId xmlns:a16="http://schemas.microsoft.com/office/drawing/2014/main" id="{C6CECED3-0968-4720-BF2E-9C7F0B7DC6DB}"/>
+              </a:ext>
+            </a:extLst>
+          </p:cNvPr>
+          <p:cNvSpPr/>
+          <p:nvPr/>
+        </p:nvSpPr>
+        <p:spPr>
+          <a:xfrm>
+            <a:off x="3280833" y="2239304"/>
+            <a:ext cx="1375834" cy="855133"/>
+          </a:xfrm>
+          <a:prstGeom prst="rect">
+            <a:avLst/>
+          </a:prstGeom>
+        </p:spPr>
+        <p:style>
+          <a:lnRef idx="2">
+            <a:schemeClr val="accent6">
+              <a:shade val="50000"/>
+            </a:schemeClr>
+          </a:lnRef>
+          <a:fillRef idx="1">
+            <a:schemeClr val="accent6"/>
+          </a:fillRef>
+          <a:effectRef idx="0">
+            <a:schemeClr val="accent6"/>
+          </a:effectRef>
+          <a:fontRef idx="minor">
+            <a:schemeClr val="lt1"/>
+          </a:fontRef>
+        </p:style>
+        <p:txBody>
+          <a:bodyPr rtlCol="0" anchor="ctr"/>
+          <a:lstStyle/>
+          <a:p>
+            <a:pPr lvl="0" algn="ctr"/>
+            <a:r>
+              <a:rPr lang="de-DE" sz="800" dirty="0" err="1">
+                <a:solidFill>
+                  <a:prstClr val="white"/>
+                </a:solidFill>
+              </a:rPr>
+              <a:t>EnterLobby_Client</a:t>
+            </a:r>
+            <a:endParaRPr lang="de-DE" sz="800" dirty="0">
+              <a:solidFill>
+                <a:prstClr val="white"/>
+              </a:solidFill>
+            </a:endParaRPr>
+          </a:p>
+        </p:txBody>
+      </p:sp>
+      <p:sp>
+        <p:nvSpPr>
+          <p:cNvPr id="37" name="Textfeld 36">
+            <a:extLst>
+              <a:ext uri="{FF2B5EF4-FFF2-40B4-BE49-F238E27FC236}">
+                <a16:creationId xmlns:a16="http://schemas.microsoft.com/office/drawing/2014/main" id="{918CCDF7-63F8-4CB1-83EE-70EFAD826724}"/>
+              </a:ext>
+            </a:extLst>
+          </p:cNvPr>
+          <p:cNvSpPr txBox="1"/>
+          <p:nvPr/>
+        </p:nvSpPr>
+        <p:spPr>
+          <a:xfrm>
+            <a:off x="3941234" y="1809270"/>
+            <a:ext cx="1003300" cy="215444"/>
+          </a:xfrm>
+          <a:prstGeom prst="rect">
+            <a:avLst/>
+          </a:prstGeom>
+          <a:noFill/>
+        </p:spPr>
+        <p:txBody>
+          <a:bodyPr wrap="square" rtlCol="0">
+            <a:spAutoFit/>
+          </a:bodyPr>
+          <a:lstStyle/>
+          <a:p>
+            <a:r>
+              <a:rPr lang="de-DE" sz="800" dirty="0" err="1"/>
+              <a:t>Invoke</a:t>
+            </a:r>
+            <a:r>
+              <a:rPr lang="de-DE" sz="800" dirty="0"/>
+              <a:t>/</a:t>
+            </a:r>
+            <a:r>
+              <a:rPr lang="de-DE" sz="800" dirty="0" err="1"/>
+              <a:t>Replace</a:t>
+            </a:r>
+            <a:endParaRPr lang="de-DE" sz="800" dirty="0"/>
+          </a:p>
+        </p:txBody>
+      </p:sp>
+      <p:sp>
+        <p:nvSpPr>
+          <p:cNvPr id="38" name="Textfeld 37">
+            <a:extLst>
+              <a:ext uri="{FF2B5EF4-FFF2-40B4-BE49-F238E27FC236}">
+                <a16:creationId xmlns:a16="http://schemas.microsoft.com/office/drawing/2014/main" id="{84128790-554F-4FC1-AD9D-4806480A1E25}"/>
+              </a:ext>
+            </a:extLst>
+          </p:cNvPr>
+          <p:cNvSpPr txBox="1"/>
+          <p:nvPr/>
+        </p:nvSpPr>
+        <p:spPr>
+          <a:xfrm>
+            <a:off x="3886202" y="1547660"/>
+            <a:ext cx="287869" cy="369332"/>
+          </a:xfrm>
+          <a:prstGeom prst="rect">
+            <a:avLst/>
+          </a:prstGeom>
+          <a:noFill/>
+        </p:spPr>
+        <p:txBody>
+          <a:bodyPr wrap="square" rtlCol="0">
+            <a:spAutoFit/>
+          </a:bodyPr>
+          <a:lstStyle/>
+          <a:p>
+            <a:r>
+              <a:rPr lang="de-DE" dirty="0"/>
+              <a:t>4</a:t>
+            </a:r>
+          </a:p>
+        </p:txBody>
+      </p:sp>
+      <p:cxnSp>
+        <p:nvCxnSpPr>
+          <p:cNvPr id="39" name="Gerade Verbindung mit Pfeil 38">
+            <a:extLst>
+              <a:ext uri="{FF2B5EF4-FFF2-40B4-BE49-F238E27FC236}">
+                <a16:creationId xmlns:a16="http://schemas.microsoft.com/office/drawing/2014/main" id="{3F310B71-77FE-491A-8508-B5DA348F9F2D}"/>
+              </a:ext>
+            </a:extLst>
+          </p:cNvPr>
+          <p:cNvCxnSpPr>
+            <a:cxnSpLocks/>
+          </p:cNvCxnSpPr>
+          <p:nvPr/>
+        </p:nvCxnSpPr>
+        <p:spPr>
+          <a:xfrm flipH="1">
+            <a:off x="1825094" y="2783634"/>
+            <a:ext cx="1417640" cy="0"/>
+          </a:xfrm>
+          <a:prstGeom prst="straightConnector1">
+            <a:avLst/>
+          </a:prstGeom>
+          <a:ln w="57150">
+            <a:tailEnd type="triangle"/>
+          </a:ln>
+        </p:spPr>
+        <p:style>
+          <a:lnRef idx="1">
+            <a:schemeClr val="accent1"/>
+          </a:lnRef>
+          <a:fillRef idx="0">
+            <a:schemeClr val="accent1"/>
+          </a:fillRef>
+          <a:effectRef idx="0">
+            <a:schemeClr val="accent1"/>
+          </a:effectRef>
+          <a:fontRef idx="minor">
+            <a:schemeClr val="tx1"/>
+          </a:fontRef>
+        </p:style>
+      </p:cxnSp>
+      <p:sp>
+        <p:nvSpPr>
+          <p:cNvPr id="42" name="Textfeld 41">
+            <a:extLst>
+              <a:ext uri="{FF2B5EF4-FFF2-40B4-BE49-F238E27FC236}">
+                <a16:creationId xmlns:a16="http://schemas.microsoft.com/office/drawing/2014/main" id="{3EA28475-6520-4A55-BBAC-58F1748A3940}"/>
+              </a:ext>
+            </a:extLst>
+          </p:cNvPr>
+          <p:cNvSpPr txBox="1"/>
+          <p:nvPr/>
+        </p:nvSpPr>
+        <p:spPr>
+          <a:xfrm>
+            <a:off x="2141008" y="2598860"/>
+            <a:ext cx="1003300" cy="215444"/>
+          </a:xfrm>
+          <a:prstGeom prst="rect">
+            <a:avLst/>
+          </a:prstGeom>
+          <a:noFill/>
+        </p:spPr>
+        <p:txBody>
+          <a:bodyPr wrap="square" rtlCol="0">
+            <a:spAutoFit/>
+          </a:bodyPr>
+          <a:lstStyle/>
+          <a:p>
+            <a:r>
+              <a:rPr lang="de-DE" sz="800" dirty="0" err="1"/>
+              <a:t>SelfBriefing</a:t>
+            </a:r>
+            <a:endParaRPr lang="de-DE" sz="800" dirty="0"/>
+          </a:p>
+        </p:txBody>
+      </p:sp>
+      <p:cxnSp>
+        <p:nvCxnSpPr>
+          <p:cNvPr id="43" name="Gerade Verbindung mit Pfeil 42">
+            <a:extLst>
+              <a:ext uri="{FF2B5EF4-FFF2-40B4-BE49-F238E27FC236}">
+                <a16:creationId xmlns:a16="http://schemas.microsoft.com/office/drawing/2014/main" id="{5FDE993B-E933-4BD2-BE79-7732FFF7B893}"/>
+              </a:ext>
+            </a:extLst>
+          </p:cNvPr>
+          <p:cNvCxnSpPr>
+            <a:cxnSpLocks/>
+          </p:cNvCxnSpPr>
+          <p:nvPr/>
+        </p:nvCxnSpPr>
+        <p:spPr>
+          <a:xfrm>
+            <a:off x="1909233" y="2929467"/>
+            <a:ext cx="1333501" cy="1"/>
+          </a:xfrm>
+          <a:prstGeom prst="straightConnector1">
+            <a:avLst/>
+          </a:prstGeom>
+          <a:ln w="57150">
+            <a:tailEnd type="triangle"/>
+          </a:ln>
+        </p:spPr>
+        <p:style>
+          <a:lnRef idx="1">
+            <a:schemeClr val="accent1"/>
+          </a:lnRef>
+          <a:fillRef idx="0">
+            <a:schemeClr val="accent1"/>
+          </a:fillRef>
+          <a:effectRef idx="0">
+            <a:schemeClr val="accent1"/>
+          </a:effectRef>
+          <a:fontRef idx="minor">
+            <a:schemeClr val="tx1"/>
+          </a:fontRef>
+        </p:style>
+      </p:cxnSp>
+      <p:sp>
+        <p:nvSpPr>
+          <p:cNvPr id="46" name="Textfeld 45">
+            <a:extLst>
+              <a:ext uri="{FF2B5EF4-FFF2-40B4-BE49-F238E27FC236}">
+                <a16:creationId xmlns:a16="http://schemas.microsoft.com/office/drawing/2014/main" id="{F9874D39-9093-4027-9E94-A8224FB37BEB}"/>
+              </a:ext>
+            </a:extLst>
+          </p:cNvPr>
+          <p:cNvSpPr txBox="1"/>
+          <p:nvPr/>
+        </p:nvSpPr>
+        <p:spPr>
+          <a:xfrm>
+            <a:off x="2105024" y="2862865"/>
+            <a:ext cx="1003300" cy="215444"/>
+          </a:xfrm>
+          <a:prstGeom prst="rect">
+            <a:avLst/>
+          </a:prstGeom>
+          <a:noFill/>
+        </p:spPr>
+        <p:txBody>
+          <a:bodyPr wrap="square" rtlCol="0">
+            <a:spAutoFit/>
+          </a:bodyPr>
+          <a:lstStyle/>
+          <a:p>
+            <a:r>
+              <a:rPr lang="de-DE" sz="800" dirty="0" err="1"/>
+              <a:t>LobbyBriefing</a:t>
+            </a:r>
+            <a:endParaRPr lang="de-DE" sz="800" dirty="0"/>
+          </a:p>
+        </p:txBody>
+      </p:sp>
+      <p:sp>
+        <p:nvSpPr>
+          <p:cNvPr id="47" name="Textfeld 46">
+            <a:extLst>
+              <a:ext uri="{FF2B5EF4-FFF2-40B4-BE49-F238E27FC236}">
+                <a16:creationId xmlns:a16="http://schemas.microsoft.com/office/drawing/2014/main" id="{834B8AD0-6586-403A-92E4-71E914584B0F}"/>
+              </a:ext>
+            </a:extLst>
+          </p:cNvPr>
+          <p:cNvSpPr txBox="1"/>
+          <p:nvPr/>
+        </p:nvSpPr>
+        <p:spPr>
+          <a:xfrm>
+            <a:off x="3054348" y="2514596"/>
+            <a:ext cx="287869" cy="369332"/>
+          </a:xfrm>
+          <a:prstGeom prst="rect">
+            <a:avLst/>
+          </a:prstGeom>
+          <a:noFill/>
+        </p:spPr>
+        <p:txBody>
+          <a:bodyPr wrap="square" rtlCol="0">
+            <a:spAutoFit/>
+          </a:bodyPr>
+          <a:lstStyle/>
+          <a:p>
+            <a:r>
+              <a:rPr lang="de-DE" dirty="0"/>
+              <a:t>5</a:t>
+            </a:r>
+          </a:p>
+        </p:txBody>
+      </p:sp>
+      <p:sp>
+        <p:nvSpPr>
+          <p:cNvPr id="49" name="Textfeld 48">
+            <a:extLst>
+              <a:ext uri="{FF2B5EF4-FFF2-40B4-BE49-F238E27FC236}">
+                <a16:creationId xmlns:a16="http://schemas.microsoft.com/office/drawing/2014/main" id="{B7955087-F663-4FBD-9AD0-899C023054D0}"/>
+              </a:ext>
+            </a:extLst>
+          </p:cNvPr>
+          <p:cNvSpPr txBox="1"/>
+          <p:nvPr/>
+        </p:nvSpPr>
+        <p:spPr>
+          <a:xfrm>
+            <a:off x="1739896" y="2808862"/>
+            <a:ext cx="287869" cy="369332"/>
+          </a:xfrm>
+          <a:prstGeom prst="rect">
+            <a:avLst/>
+          </a:prstGeom>
+          <a:noFill/>
+        </p:spPr>
+        <p:txBody>
+          <a:bodyPr wrap="square" rtlCol="0">
+            <a:spAutoFit/>
+          </a:bodyPr>
+          <a:lstStyle/>
+          <a:p>
+            <a:r>
+              <a:rPr lang="de-DE" dirty="0"/>
+              <a:t>6</a:t>
+            </a:r>
+          </a:p>
+        </p:txBody>
+      </p:sp>
+      <p:cxnSp>
+        <p:nvCxnSpPr>
+          <p:cNvPr id="50" name="Gerade Verbindung mit Pfeil 49">
+            <a:extLst>
+              <a:ext uri="{FF2B5EF4-FFF2-40B4-BE49-F238E27FC236}">
+                <a16:creationId xmlns:a16="http://schemas.microsoft.com/office/drawing/2014/main" id="{C681D13A-A91E-4B5B-9FCE-09B2363B358B}"/>
+              </a:ext>
+            </a:extLst>
+          </p:cNvPr>
+          <p:cNvCxnSpPr>
+            <a:cxnSpLocks/>
+          </p:cNvCxnSpPr>
+          <p:nvPr/>
+        </p:nvCxnSpPr>
+        <p:spPr>
+          <a:xfrm flipH="1">
+            <a:off x="3877739" y="3132120"/>
+            <a:ext cx="6352" cy="569258"/>
+          </a:xfrm>
+          <a:prstGeom prst="straightConnector1">
+            <a:avLst/>
+          </a:prstGeom>
+          <a:ln w="57150">
+            <a:tailEnd type="triangle"/>
+          </a:ln>
+        </p:spPr>
+        <p:style>
+          <a:lnRef idx="1">
+            <a:schemeClr val="accent1"/>
+          </a:lnRef>
+          <a:fillRef idx="0">
+            <a:schemeClr val="accent1"/>
+          </a:fillRef>
+          <a:effectRef idx="0">
+            <a:schemeClr val="accent1"/>
+          </a:effectRef>
+          <a:fontRef idx="minor">
+            <a:schemeClr val="tx1"/>
+          </a:fontRef>
+        </p:style>
+      </p:cxnSp>
+      <p:sp>
+        <p:nvSpPr>
+          <p:cNvPr id="51" name="Textfeld 50">
+            <a:extLst>
+              <a:ext uri="{FF2B5EF4-FFF2-40B4-BE49-F238E27FC236}">
+                <a16:creationId xmlns:a16="http://schemas.microsoft.com/office/drawing/2014/main" id="{4D279DD9-43C8-4D45-B0D7-D76429D74A5D}"/>
+              </a:ext>
+            </a:extLst>
+          </p:cNvPr>
+          <p:cNvSpPr txBox="1"/>
+          <p:nvPr/>
+        </p:nvSpPr>
+        <p:spPr>
+          <a:xfrm>
+            <a:off x="3797299" y="2893643"/>
+            <a:ext cx="287869" cy="369332"/>
+          </a:xfrm>
+          <a:prstGeom prst="rect">
+            <a:avLst/>
+          </a:prstGeom>
+          <a:noFill/>
+        </p:spPr>
+        <p:txBody>
+          <a:bodyPr wrap="square" rtlCol="0">
+            <a:spAutoFit/>
+          </a:bodyPr>
+          <a:lstStyle/>
+          <a:p>
+            <a:r>
+              <a:rPr lang="de-DE" dirty="0"/>
+              <a:t>7</a:t>
+            </a:r>
+          </a:p>
+        </p:txBody>
+      </p:sp>
+      <p:sp>
+        <p:nvSpPr>
+          <p:cNvPr id="52" name="Textfeld 51">
+            <a:extLst>
+              <a:ext uri="{FF2B5EF4-FFF2-40B4-BE49-F238E27FC236}">
+                <a16:creationId xmlns:a16="http://schemas.microsoft.com/office/drawing/2014/main" id="{9BDA5A48-CB07-4CD8-B3A3-311EC85E74BA}"/>
+              </a:ext>
+            </a:extLst>
+          </p:cNvPr>
+          <p:cNvSpPr txBox="1"/>
+          <p:nvPr/>
+        </p:nvSpPr>
+        <p:spPr>
+          <a:xfrm>
+            <a:off x="3894675" y="3206370"/>
+            <a:ext cx="1003300" cy="215444"/>
+          </a:xfrm>
+          <a:prstGeom prst="rect">
+            <a:avLst/>
+          </a:prstGeom>
+          <a:noFill/>
+        </p:spPr>
+        <p:txBody>
+          <a:bodyPr wrap="square" rtlCol="0">
+            <a:spAutoFit/>
+          </a:bodyPr>
+          <a:lstStyle/>
+          <a:p>
+            <a:r>
+              <a:rPr lang="de-DE" sz="800" dirty="0" err="1"/>
+              <a:t>Invoke</a:t>
+            </a:r>
+            <a:r>
+              <a:rPr lang="de-DE" sz="800" dirty="0"/>
+              <a:t>/</a:t>
+            </a:r>
+            <a:r>
+              <a:rPr lang="de-DE" sz="800" dirty="0" err="1"/>
+              <a:t>Replace</a:t>
+            </a:r>
+            <a:endParaRPr lang="de-DE" sz="800" dirty="0"/>
+          </a:p>
+        </p:txBody>
+      </p:sp>
+      <p:sp>
+        <p:nvSpPr>
+          <p:cNvPr id="53" name="Rechteck 52">
+            <a:extLst>
+              <a:ext uri="{FF2B5EF4-FFF2-40B4-BE49-F238E27FC236}">
+                <a16:creationId xmlns:a16="http://schemas.microsoft.com/office/drawing/2014/main" id="{833C042C-2836-445D-A66E-17AEA6F6DFB8}"/>
+              </a:ext>
+            </a:extLst>
+          </p:cNvPr>
+          <p:cNvSpPr/>
+          <p:nvPr/>
+        </p:nvSpPr>
+        <p:spPr>
+          <a:xfrm>
+            <a:off x="3280833" y="3677965"/>
+            <a:ext cx="1375834" cy="855133"/>
+          </a:xfrm>
+          <a:prstGeom prst="rect">
+            <a:avLst/>
+          </a:prstGeom>
+        </p:spPr>
+        <p:style>
+          <a:lnRef idx="2">
+            <a:schemeClr val="accent6">
+              <a:shade val="50000"/>
+            </a:schemeClr>
+          </a:lnRef>
+          <a:fillRef idx="1">
+            <a:schemeClr val="accent6"/>
+          </a:fillRef>
+          <a:effectRef idx="0">
+            <a:schemeClr val="accent6"/>
+          </a:effectRef>
+          <a:fontRef idx="minor">
+            <a:schemeClr val="lt1"/>
+          </a:fontRef>
+        </p:style>
+        <p:txBody>
+          <a:bodyPr rtlCol="0" anchor="ctr"/>
+          <a:lstStyle/>
+          <a:p>
+            <a:pPr lvl="0" algn="ctr"/>
+            <a:r>
+              <a:rPr lang="de-DE" sz="800" dirty="0" err="1">
+                <a:solidFill>
+                  <a:prstClr val="white"/>
+                </a:solidFill>
+              </a:rPr>
+              <a:t>SitInLobby</a:t>
+            </a:r>
+            <a:endParaRPr lang="de-DE" sz="800" dirty="0">
+              <a:solidFill>
+                <a:prstClr val="white"/>
+              </a:solidFill>
+            </a:endParaRPr>
+          </a:p>
+        </p:txBody>
+      </p:sp>
+    </p:spTree>
+    <p:extLst>
+      <p:ext uri="{BB962C8B-B14F-4D97-AF65-F5344CB8AC3E}">
+        <p14:creationId xmlns:p14="http://schemas.microsoft.com/office/powerpoint/2010/main" val="1212982997"/>
       </p:ext>
     </p:extLst>
   </p:cSld>

</xml_diff>